<commit_message>
createMultipageIndicatorsPpt finalized + refactor + changing yellow color to orange
</commit_message>
<xml_diff>
--- a/html-to-ppt/createMultipageCustomizablePpt.pptx
+++ b/html-to-ppt/createMultipageCustomizablePpt.pptx
@@ -3695,7 +3695,7 @@
                       <a:tailEnd type="none" w="med" len="med"/>
                     </a:lnB>
                     <a:solidFill>
-                      <a:srgbClr val="FFFF00"/>
+                      <a:srgbClr val="FFC800"/>
                     </a:solidFill>
                   </a:tcPr>
                 </a:tc>
@@ -5370,7 +5370,7 @@
             <a:r>
               <a:rPr lang="en-US" sz="1400" b="true">
                 <a:solidFill>
-                  <a:srgbClr val="FFFF00"/>
+                  <a:srgbClr val="FFA500"/>
                 </a:solidFill>
                 <a:latin typeface="Calibri"/>
               </a:rPr>
@@ -6578,7 +6578,7 @@
             <a:r>
               <a:rPr lang="en-US" sz="1400" b="true" u="sng">
                 <a:solidFill>
-                  <a:srgbClr val="FFFF00"/>
+                  <a:srgbClr val="FFC800"/>
                 </a:solidFill>
                 <a:latin typeface="Calibri"/>
               </a:rPr>

</xml_diff>